<commit_message>
Updates in slides week 1
</commit_message>
<xml_diff>
--- a/Lectures/week 1/week 1 - Course Information 2023.pptx
+++ b/Lectures/week 1/week 1 - Course Information 2023.pptx
@@ -5314,15 +5314,16 @@
               <a:rPr lang="en-GB" dirty="0">
                 <a:hlinkClick r:id="rId2"/>
               </a:rPr>
-              <a:t>https://edstem.org/eu/courses/90/discussion/</a:t>
-            </a:r>
-            <a:endParaRPr lang="en-US" dirty="0"/>
-          </a:p>
-          <a:p>
-            <a:pPr marL="457200" indent="-457200">
-              <a:buFont typeface="Arial" panose="020B0604020202020204" pitchFamily="34" charset="0"/>
-              <a:buChar char="•"/>
-            </a:pPr>
+              <a:t>https://edstem.org/eu/courses/831/discussion/</a:t>
+            </a:r>
+            <a:endParaRPr lang="en-GB" dirty="0"/>
+          </a:p>
+          <a:p>
+            <a:pPr indent="-285750"/>
+            <a:endParaRPr lang="en-GB" dirty="0"/>
+          </a:p>
+          <a:p>
+            <a:pPr indent="-285750"/>
             <a:r>
               <a:rPr lang="en-GB" dirty="0"/>
               <a:t>Both among students and with assistants</a:t>
@@ -10052,24 +10053,28 @@
               </a:rPr>
               <a:t>mohammadreza.banaei@epfl.ch</a:t>
             </a:r>
-            <a:endParaRPr lang="en-US" sz="1600" dirty="0"/>
+            <a:endParaRPr lang="en-GB" sz="1600" dirty="0"/>
           </a:p>
           <a:p>
             <a:pPr lvl="1"/>
             <a:r>
-              <a:rPr lang="en-US" sz="1600" dirty="0" err="1"/>
-              <a:t>Mokhtarian</a:t>
-            </a:r>
-            <a:r>
               <a:rPr lang="en-US" sz="1600" dirty="0"/>
-              <a:t> Ehsan 		</a:t>
+              <a:t>William Cappelletti		</a:t>
             </a:r>
             <a:r>
               <a:rPr lang="en-US" sz="1600" dirty="0">
                 <a:hlinkClick r:id="rId8"/>
               </a:rPr>
-              <a:t>ehsan.mokhtarian@epfl.ch</a:t>
-            </a:r>
+              <a:t>william.cappelletti@epfl.ch</a:t>
+            </a:r>
+            <a:endParaRPr lang="en-US" sz="1600" dirty="0"/>
+          </a:p>
+          <a:p>
+            <a:pPr lvl="1"/>
+            <a:endParaRPr lang="en-US" sz="1600" dirty="0"/>
+          </a:p>
+          <a:p>
+            <a:pPr lvl="1"/>
             <a:endParaRPr lang="en-US" sz="1600" dirty="0"/>
           </a:p>
         </p:txBody>

</xml_diff>